<commit_message>
Fixed a typo on the Operator Overloading Slide
</commit_message>
<xml_diff>
--- a/unit2/Unit2 - C++ Einfuehrung.pptx
+++ b/unit2/Unit2 - C++ Einfuehrung.pptx
@@ -367,7 +367,7 @@
             <a:fld id="{AA592FF2-A4BD-4E98-AC76-A10007E04C10}" type="datetimeFigureOut">
               <a:rPr lang="en-US" smtClean="0"/>
               <a:pPr/>
-              <a:t>4/16/23</a:t>
+              <a:t>4/20/23</a:t>
             </a:fld>
             <a:endParaRPr lang="en-US" dirty="0"/>
           </a:p>
@@ -1224,7 +1224,7 @@
             <a:fld id="{AA592FF2-A4BD-4E98-AC76-A10007E04C10}" type="datetimeFigureOut">
               <a:rPr lang="en-US" smtClean="0"/>
               <a:pPr/>
-              <a:t>4/16/23</a:t>
+              <a:t>4/20/23</a:t>
             </a:fld>
             <a:endParaRPr lang="en-US" dirty="0"/>
           </a:p>
@@ -11659,7 +11659,7 @@
                 <a:ea typeface="ＭＳ Ｐゴシック" panose="020B0600070205080204" pitchFamily="34" charset="-128"/>
                 <a:cs typeface="Courier New" panose="02070309020205020404" pitchFamily="49" charset="0"/>
               </a:rPr>
-              <a:t>MyType</a:t>
+              <a:t>const</a:t>
             </a:r>
             <a:r>
               <a:rPr lang="de-DE" altLang="en-DE" sz="1200" dirty="0">
@@ -11675,7 +11675,7 @@
                 <a:ea typeface="ＭＳ Ｐゴシック" panose="020B0600070205080204" pitchFamily="34" charset="-128"/>
                 <a:cs typeface="Courier New" panose="02070309020205020404" pitchFamily="49" charset="0"/>
               </a:rPr>
-              <a:t>const</a:t>
+              <a:t>MyType</a:t>
             </a:r>
             <a:r>
               <a:rPr lang="de-DE" altLang="en-DE" sz="1200" dirty="0">
@@ -11691,7 +11691,7 @@
                 <a:ea typeface="ＭＳ Ｐゴシック" panose="020B0600070205080204" pitchFamily="34" charset="-128"/>
                 <a:cs typeface="Courier New" panose="02070309020205020404" pitchFamily="49" charset="0"/>
               </a:rPr>
-              <a:t>MyType</a:t>
+              <a:t>const</a:t>
             </a:r>
             <a:r>
               <a:rPr lang="de-DE" altLang="en-DE" sz="1200" dirty="0">
@@ -11707,7 +11707,15 @@
                 <a:ea typeface="ＭＳ Ｐゴシック" panose="020B0600070205080204" pitchFamily="34" charset="-128"/>
                 <a:cs typeface="Courier New" panose="02070309020205020404" pitchFamily="49" charset="0"/>
               </a:rPr>
-              <a:t>const</a:t>
+              <a:t>MyType</a:t>
+            </a:r>
+            <a:r>
+              <a:rPr lang="de-DE" altLang="en-DE" sz="1200">
+                <a:latin typeface="Courier New" panose="02070309020205020404" pitchFamily="49" charset="0"/>
+                <a:ea typeface="ＭＳ Ｐゴシック" panose="020B0600070205080204" pitchFamily="34" charset="-128"/>
+                <a:cs typeface="Courier New" panose="02070309020205020404" pitchFamily="49" charset="0"/>
+              </a:rPr>
+              <a:t>&amp; </a:t>
             </a:r>
             <a:r>
               <a:rPr lang="de-DE" altLang="en-DE" sz="1200" dirty="0">
@@ -11715,7 +11723,7 @@
                 <a:ea typeface="ＭＳ Ｐゴシック" panose="020B0600070205080204" pitchFamily="34" charset="-128"/>
                 <a:cs typeface="Courier New" panose="02070309020205020404" pitchFamily="49" charset="0"/>
               </a:rPr>
-              <a:t>&amp; b) { … }</a:t>
+              <a:t>b) { … }</a:t>
             </a:r>
           </a:p>
         </p:txBody>

</xml_diff>

<commit_message>
Small fixes for mis-understandings in Unit 2
</commit_message>
<xml_diff>
--- a/unit2/Unit2 - C++ Einfuehrung.pptx
+++ b/unit2/Unit2 - C++ Einfuehrung.pptx
@@ -367,7 +367,7 @@
             <a:fld id="{AA592FF2-A4BD-4E98-AC76-A10007E04C10}" type="datetimeFigureOut">
               <a:rPr lang="en-US" smtClean="0"/>
               <a:pPr/>
-              <a:t>4/20/23</a:t>
+              <a:t>4/28/23</a:t>
             </a:fld>
             <a:endParaRPr lang="en-US" dirty="0"/>
           </a:p>
@@ -1224,7 +1224,7 @@
             <a:fld id="{AA592FF2-A4BD-4E98-AC76-A10007E04C10}" type="datetimeFigureOut">
               <a:rPr lang="en-US" smtClean="0"/>
               <a:pPr/>
-              <a:t>4/20/23</a:t>
+              <a:t>4/28/23</a:t>
             </a:fld>
             <a:endParaRPr lang="en-US" dirty="0"/>
           </a:p>
@@ -17080,7 +17080,7 @@
                 <a:latin typeface="Courier New" panose="02070309020205020404" pitchFamily="49" charset="0"/>
                 <a:cs typeface="Courier New" panose="02070309020205020404" pitchFamily="49" charset="0"/>
               </a:rPr>
-              <a:t>A</a:t>
+              <a:t>B</a:t>
             </a:r>
             <a:r>
               <a:rPr lang="de-DE" dirty="0"/>
@@ -17099,7 +17099,7 @@
                 <a:latin typeface="Courier New" panose="02070309020205020404" pitchFamily="49" charset="0"/>
                 <a:cs typeface="Courier New" panose="02070309020205020404" pitchFamily="49" charset="0"/>
               </a:rPr>
-              <a:t>B</a:t>
+              <a:t>A</a:t>
             </a:r>
             <a:r>
               <a:rPr lang="de-DE" dirty="0"/>
@@ -17110,37 +17110,37 @@
                 <a:latin typeface="Courier New" panose="02070309020205020404" pitchFamily="49" charset="0"/>
                 <a:cs typeface="Courier New" panose="02070309020205020404" pitchFamily="49" charset="0"/>
               </a:rPr>
-              <a:t>A</a:t>
+              <a:t>B</a:t>
             </a:r>
             <a:r>
               <a:rPr lang="de-DE" dirty="0"/>
-              <a:t> eine abgeleitete Klasse von </a:t>
+              <a:t> eine abgeleitete Klasse (</a:t>
+            </a:r>
+            <a:r>
+              <a:rPr lang="en-US" i="1" dirty="0"/>
+              <a:t>derived class</a:t>
+            </a:r>
+            <a:r>
+              <a:rPr lang="de-DE" dirty="0"/>
+              <a:t>) von </a:t>
             </a:r>
             <a:r>
               <a:rPr lang="de-DE" dirty="0">
                 <a:latin typeface="Courier New" panose="02070309020205020404" pitchFamily="49" charset="0"/>
                 <a:cs typeface="Courier New" panose="02070309020205020404" pitchFamily="49" charset="0"/>
               </a:rPr>
-              <a:t>B</a:t>
+              <a:t>A</a:t>
             </a:r>
             <a:r>
               <a:rPr lang="de-DE" dirty="0"/>
-              <a:t> (</a:t>
-            </a:r>
-            <a:r>
-              <a:rPr lang="en-US" i="1" dirty="0"/>
-              <a:t>derived class</a:t>
-            </a:r>
-            <a:r>
-              <a:rPr lang="de-DE" dirty="0"/>
-              <a:t>) und </a:t>
+              <a:t> und </a:t>
             </a:r>
             <a:r>
               <a:rPr lang="de-DE" dirty="0">
                 <a:latin typeface="Courier New" panose="02070309020205020404" pitchFamily="49" charset="0"/>
                 <a:cs typeface="Courier New" panose="02070309020205020404" pitchFamily="49" charset="0"/>
               </a:rPr>
-              <a:t>B</a:t>
+              <a:t>A</a:t>
             </a:r>
             <a:r>
               <a:rPr lang="de-DE" dirty="0"/>
@@ -30762,49 +30762,49 @@
           <a:p>
             <a:pPr lvl="1"/>
             <a:r>
+              <a:rPr lang="de-DE" altLang="en-DE" sz="1200" dirty="0">
+                <a:latin typeface="Courier New" panose="02070309020205020404" pitchFamily="49" charset="0"/>
+                <a:ea typeface="ＭＳ Ｐゴシック" panose="020B0600070205080204" pitchFamily="34" charset="-128"/>
+                <a:cs typeface="Courier New" panose="02070309020205020404" pitchFamily="49" charset="0"/>
+              </a:rPr>
+              <a:t>/*...*/</a:t>
+            </a:r>
+            <a:r>
+              <a:rPr lang="de-DE" altLang="en-DE" sz="1200" dirty="0">
+                <a:ea typeface="ＭＳ Ｐゴシック" panose="020B0600070205080204" pitchFamily="34" charset="-128"/>
+              </a:rPr>
+              <a:t> Kommentare, die sich über mehrere Zeilen erstrecken (wie C)</a:t>
+            </a:r>
+          </a:p>
+          <a:p>
+            <a:pPr lvl="1"/>
+            <a:r>
+              <a:rPr lang="de-DE" altLang="en-DE" sz="1200" dirty="0">
+                <a:latin typeface="Courier New" panose="02070309020205020404" pitchFamily="49" charset="0"/>
+                <a:ea typeface="ＭＳ Ｐゴシック" panose="020B0600070205080204" pitchFamily="34" charset="-128"/>
+                <a:cs typeface="Courier New" panose="02070309020205020404" pitchFamily="49" charset="0"/>
+              </a:rPr>
+              <a:t>//... </a:t>
+            </a:r>
+            <a:r>
+              <a:rPr lang="de-DE" altLang="en-DE" sz="1200" dirty="0">
+                <a:ea typeface="ＭＳ Ｐゴシック" panose="020B0600070205080204" pitchFamily="34" charset="-128"/>
+              </a:rPr>
+              <a:t>Kommentare, so dass der Compiler den Rest der Zeile ignoriert</a:t>
+            </a:r>
+          </a:p>
+          <a:p>
+            <a:r>
+              <a:rPr lang="de-DE" altLang="en-DE" b="1" dirty="0">
+                <a:ea typeface="ＭＳ Ｐゴシック" panose="020B0600070205080204" pitchFamily="34" charset="-128"/>
+              </a:rPr>
+              <a:t>Initialisierungen </a:t>
+            </a:r>
+            <a:r>
               <a:rPr lang="de-DE" altLang="en-DE" dirty="0">
-                <a:latin typeface="Courier New" panose="02070309020205020404" pitchFamily="49" charset="0"/>
-                <a:ea typeface="ＭＳ Ｐゴシック" panose="020B0600070205080204" pitchFamily="34" charset="-128"/>
-                <a:cs typeface="Courier New" panose="02070309020205020404" pitchFamily="49" charset="0"/>
-              </a:rPr>
-              <a:t>/*...*/</a:t>
-            </a:r>
-            <a:r>
-              <a:rPr lang="de-DE" altLang="en-DE" dirty="0">
-                <a:ea typeface="ＭＳ Ｐゴシック" panose="020B0600070205080204" pitchFamily="34" charset="-128"/>
-              </a:rPr>
-              <a:t> Kommentare, die sich über mehrere Zeilen erstrecken (wie C)</a:t>
-            </a:r>
-          </a:p>
-          <a:p>
-            <a:pPr lvl="1"/>
-            <a:r>
-              <a:rPr lang="de-DE" altLang="en-DE" dirty="0">
-                <a:latin typeface="Courier New" panose="02070309020205020404" pitchFamily="49" charset="0"/>
-                <a:ea typeface="ＭＳ Ｐゴシック" panose="020B0600070205080204" pitchFamily="34" charset="-128"/>
-                <a:cs typeface="Courier New" panose="02070309020205020404" pitchFamily="49" charset="0"/>
-              </a:rPr>
-              <a:t>//... </a:t>
-            </a:r>
-            <a:r>
-              <a:rPr lang="de-DE" altLang="en-DE" dirty="0">
-                <a:ea typeface="ＭＳ Ｐゴシック" panose="020B0600070205080204" pitchFamily="34" charset="-128"/>
-              </a:rPr>
-              <a:t>Kommentare, so dass der Compiler den Rest der Zeile ignoriert</a:t>
-            </a:r>
-          </a:p>
-          <a:p>
-            <a:r>
-              <a:rPr lang="de-DE" altLang="en-DE" b="1" dirty="0">
-                <a:ea typeface="ＭＳ Ｐゴシック" panose="020B0600070205080204" pitchFamily="34" charset="-128"/>
-              </a:rPr>
-              <a:t>Initialisierungen </a:t>
-            </a:r>
-            <a:r>
-              <a:rPr lang="de-DE" altLang="en-DE" dirty="0">
-                <a:ea typeface="ＭＳ Ｐゴシック" panose="020B0600070205080204" pitchFamily="34" charset="-128"/>
-              </a:rPr>
-              <a:t>bei Deklaration haben eine zusätzliche Syntax, die verlustvolle Typkonversationen erkennen und explizite Zuweisung verhindern: </a:t>
+                <a:ea typeface="ＭＳ Ｐゴシック" panose="020B0600070205080204" pitchFamily="34" charset="-128"/>
+              </a:rPr>
+              <a:t>bei Deklaration haben eine zusätzliche Syntax, die verlustvolle Typkonvertierungen erkennen und explizite Zuweisung verhindern: </a:t>
             </a:r>
             <a:r>
               <a:rPr lang="en-US" altLang="en-DE" dirty="0">
@@ -30826,7 +30826,21 @@
                 <a:ea typeface="ＭＳ Ｐゴシック" panose="020B0600070205080204" pitchFamily="34" charset="-128"/>
                 <a:cs typeface="Courier New" panose="02070309020205020404" pitchFamily="49" charset="0"/>
               </a:rPr>
-              <a:t>T variable = { value } </a:t>
+              <a:t>T variable = { value }</a:t>
+            </a:r>
+            <a:r>
+              <a:rPr lang="de-DE" altLang="en-DE" dirty="0">
+                <a:ea typeface="ＭＳ Ｐゴシック" panose="020B0600070205080204" pitchFamily="34" charset="-128"/>
+              </a:rPr>
+              <a:t> oder </a:t>
+            </a:r>
+            <a:r>
+              <a:rPr lang="en-US" altLang="en-DE" dirty="0">
+                <a:latin typeface="Courier New" panose="02070309020205020404" pitchFamily="49" charset="0"/>
+                <a:ea typeface="ＭＳ Ｐゴシック" panose="020B0600070205080204" pitchFamily="34" charset="-128"/>
+                <a:cs typeface="Courier New" panose="02070309020205020404" pitchFamily="49" charset="0"/>
+              </a:rPr>
+              <a:t>T variable = value </a:t>
             </a:r>
             <a:endParaRPr lang="de-DE" altLang="en-DE" b="1" dirty="0">
               <a:ea typeface="ＭＳ Ｐゴシック" panose="020B0600070205080204" pitchFamily="34" charset="-128"/>
@@ -35784,7 +35798,7 @@
               <a:t>Beispiel (</a:t>
             </a:r>
             <a:r>
-              <a:rPr lang="en-US" altLang="en-DE" sz="1200" b="1" dirty="0" err="1">
+              <a:rPr lang="en-US" altLang="en-DE" sz="1200" b="1" i="1" dirty="0" err="1">
                 <a:ea typeface="ＭＳ Ｐゴシック" panose="020B0600070205080204" pitchFamily="34" charset="-128"/>
               </a:rPr>
               <a:t>ctd</a:t>

</xml_diff>